<commit_message>
Update the proof file
</commit_message>
<xml_diff>
--- a/Lab 2/Data structure and algorithm Tutorial 2.pptx
+++ b/Lab 2/Data structure and algorithm Tutorial 2.pptx
@@ -121,6 +121,11 @@
       </a:defRPr>
     </a:lvl9pPr>
   </p:defaultTextStyle>
+  <p:extLst>
+    <p:ext uri="{EFAFB233-063F-42B5-8137-9DF3F51BA10A}">
+      <p15:sldGuideLst xmlns:p15="http://schemas.microsoft.com/office/powerpoint/2012/main"/>
+    </p:ext>
+  </p:extLst>
 </p:presentation>
 </file>
 
@@ -3058,7 +3063,7 @@
           <a:p>
             <a:fld id="{9727C62E-E19A-4E21-9BC3-35BD44E631EE}" type="datetimeFigureOut">
               <a:rPr lang="en-US" smtClean="0"/>
-              <a:t>9/19/2020</a:t>
+              <a:t>9/20/2020</a:t>
             </a:fld>
             <a:endParaRPr lang="en-US"/>
           </a:p>
@@ -3256,7 +3261,7 @@
           <a:p>
             <a:fld id="{9727C62E-E19A-4E21-9BC3-35BD44E631EE}" type="datetimeFigureOut">
               <a:rPr lang="en-US" smtClean="0"/>
-              <a:t>9/19/2020</a:t>
+              <a:t>9/20/2020</a:t>
             </a:fld>
             <a:endParaRPr lang="en-US"/>
           </a:p>
@@ -3464,7 +3469,7 @@
           <a:p>
             <a:fld id="{9727C62E-E19A-4E21-9BC3-35BD44E631EE}" type="datetimeFigureOut">
               <a:rPr lang="en-US" smtClean="0"/>
-              <a:t>9/19/2020</a:t>
+              <a:t>9/20/2020</a:t>
             </a:fld>
             <a:endParaRPr lang="en-US"/>
           </a:p>
@@ -3662,7 +3667,7 @@
           <a:p>
             <a:fld id="{9727C62E-E19A-4E21-9BC3-35BD44E631EE}" type="datetimeFigureOut">
               <a:rPr lang="en-US" smtClean="0"/>
-              <a:t>9/19/2020</a:t>
+              <a:t>9/20/2020</a:t>
             </a:fld>
             <a:endParaRPr lang="en-US"/>
           </a:p>
@@ -3937,7 +3942,7 @@
           <a:p>
             <a:fld id="{9727C62E-E19A-4E21-9BC3-35BD44E631EE}" type="datetimeFigureOut">
               <a:rPr lang="en-US" smtClean="0"/>
-              <a:t>9/19/2020</a:t>
+              <a:t>9/20/2020</a:t>
             </a:fld>
             <a:endParaRPr lang="en-US"/>
           </a:p>
@@ -4202,7 +4207,7 @@
           <a:p>
             <a:fld id="{9727C62E-E19A-4E21-9BC3-35BD44E631EE}" type="datetimeFigureOut">
               <a:rPr lang="en-US" smtClean="0"/>
-              <a:t>9/19/2020</a:t>
+              <a:t>9/20/2020</a:t>
             </a:fld>
             <a:endParaRPr lang="en-US"/>
           </a:p>
@@ -4614,7 +4619,7 @@
           <a:p>
             <a:fld id="{9727C62E-E19A-4E21-9BC3-35BD44E631EE}" type="datetimeFigureOut">
               <a:rPr lang="en-US" smtClean="0"/>
-              <a:t>9/19/2020</a:t>
+              <a:t>9/20/2020</a:t>
             </a:fld>
             <a:endParaRPr lang="en-US"/>
           </a:p>
@@ -4755,7 +4760,7 @@
           <a:p>
             <a:fld id="{9727C62E-E19A-4E21-9BC3-35BD44E631EE}" type="datetimeFigureOut">
               <a:rPr lang="en-US" smtClean="0"/>
-              <a:t>9/19/2020</a:t>
+              <a:t>9/20/2020</a:t>
             </a:fld>
             <a:endParaRPr lang="en-US"/>
           </a:p>
@@ -4868,7 +4873,7 @@
           <a:p>
             <a:fld id="{9727C62E-E19A-4E21-9BC3-35BD44E631EE}" type="datetimeFigureOut">
               <a:rPr lang="en-US" smtClean="0"/>
-              <a:t>9/19/2020</a:t>
+              <a:t>9/20/2020</a:t>
             </a:fld>
             <a:endParaRPr lang="en-US"/>
           </a:p>
@@ -5179,7 +5184,7 @@
           <a:p>
             <a:fld id="{9727C62E-E19A-4E21-9BC3-35BD44E631EE}" type="datetimeFigureOut">
               <a:rPr lang="en-US" smtClean="0"/>
-              <a:t>9/19/2020</a:t>
+              <a:t>9/20/2020</a:t>
             </a:fld>
             <a:endParaRPr lang="en-US"/>
           </a:p>
@@ -5467,7 +5472,7 @@
           <a:p>
             <a:fld id="{9727C62E-E19A-4E21-9BC3-35BD44E631EE}" type="datetimeFigureOut">
               <a:rPr lang="en-US" smtClean="0"/>
-              <a:t>9/19/2020</a:t>
+              <a:t>9/20/2020</a:t>
             </a:fld>
             <a:endParaRPr lang="en-US"/>
           </a:p>
@@ -5708,7 +5713,7 @@
           <a:p>
             <a:fld id="{9727C62E-E19A-4E21-9BC3-35BD44E631EE}" type="datetimeFigureOut">
               <a:rPr lang="en-US" smtClean="0"/>
-              <a:t>9/19/2020</a:t>
+              <a:t>9/20/2020</a:t>
             </a:fld>
             <a:endParaRPr lang="en-US"/>
           </a:p>
@@ -8989,7 +8994,7 @@
                   </a:schemeClr>
                 </a:solidFill>
               </a:rPr>
-              <a:t>n + 1</a:t>
+              <a:t>n</a:t>
             </a:r>
           </a:p>
         </p:txBody>
@@ -9031,7 +9036,7 @@
                   </a:schemeClr>
                 </a:solidFill>
               </a:rPr>
-              <a:t>n + 1</a:t>
+              <a:t>n</a:t>
             </a:r>
           </a:p>
         </p:txBody>
@@ -9195,7 +9200,7 @@
                   </a:schemeClr>
                 </a:solidFill>
               </a:rPr>
-              <a:t>f(n) = 3n + 4</a:t>
+              <a:t>f(n) = 3n + 2</a:t>
             </a:r>
           </a:p>
         </p:txBody>
@@ -9240,7 +9245,7 @@
             </a:r>
             <a:r>
               <a:rPr lang="en-US" sz="1600" b="1" i="1" u="sng" dirty="0"/>
-              <a:t>The proof of f(n)=3n+4.pdf</a:t>
+              <a:t>The proof of f(n)=3n+2.pdf</a:t>
             </a:r>
           </a:p>
         </p:txBody>

</xml_diff>